<commit_message>
Finish PowerPoint for Interim
</commit_message>
<xml_diff>
--- a/Project1/Reports/BIOS6623_Project1_InterimAnalysisPlan.pptx
+++ b/Project1/Reports/BIOS6623_Project1_InterimAnalysisPlan.pptx
@@ -246,7 +246,7 @@
           <a:p>
             <a:fld id="{E2B49FB2-5219-46EB-905E-F29C7E013D5A}" type="datetimeFigureOut">
               <a:rPr lang="en-US" smtClean="0"/>
-              <a:t>9/24/2017</a:t>
+              <a:t>9/25/2017</a:t>
             </a:fld>
             <a:endParaRPr lang="en-US"/>
           </a:p>
@@ -416,7 +416,7 @@
           <a:p>
             <a:fld id="{E2B49FB2-5219-46EB-905E-F29C7E013D5A}" type="datetimeFigureOut">
               <a:rPr lang="en-US" smtClean="0"/>
-              <a:t>9/24/2017</a:t>
+              <a:t>9/25/2017</a:t>
             </a:fld>
             <a:endParaRPr lang="en-US"/>
           </a:p>
@@ -596,7 +596,7 @@
           <a:p>
             <a:fld id="{E2B49FB2-5219-46EB-905E-F29C7E013D5A}" type="datetimeFigureOut">
               <a:rPr lang="en-US" smtClean="0"/>
-              <a:t>9/24/2017</a:t>
+              <a:t>9/25/2017</a:t>
             </a:fld>
             <a:endParaRPr lang="en-US"/>
           </a:p>
@@ -766,7 +766,7 @@
           <a:p>
             <a:fld id="{E2B49FB2-5219-46EB-905E-F29C7E013D5A}" type="datetimeFigureOut">
               <a:rPr lang="en-US" smtClean="0"/>
-              <a:t>9/24/2017</a:t>
+              <a:t>9/25/2017</a:t>
             </a:fld>
             <a:endParaRPr lang="en-US"/>
           </a:p>
@@ -1012,7 +1012,7 @@
           <a:p>
             <a:fld id="{E2B49FB2-5219-46EB-905E-F29C7E013D5A}" type="datetimeFigureOut">
               <a:rPr lang="en-US" smtClean="0"/>
-              <a:t>9/24/2017</a:t>
+              <a:t>9/25/2017</a:t>
             </a:fld>
             <a:endParaRPr lang="en-US"/>
           </a:p>
@@ -1244,7 +1244,7 @@
           <a:p>
             <a:fld id="{E2B49FB2-5219-46EB-905E-F29C7E013D5A}" type="datetimeFigureOut">
               <a:rPr lang="en-US" smtClean="0"/>
-              <a:t>9/24/2017</a:t>
+              <a:t>9/25/2017</a:t>
             </a:fld>
             <a:endParaRPr lang="en-US"/>
           </a:p>
@@ -1611,7 +1611,7 @@
           <a:p>
             <a:fld id="{E2B49FB2-5219-46EB-905E-F29C7E013D5A}" type="datetimeFigureOut">
               <a:rPr lang="en-US" smtClean="0"/>
-              <a:t>9/24/2017</a:t>
+              <a:t>9/25/2017</a:t>
             </a:fld>
             <a:endParaRPr lang="en-US"/>
           </a:p>
@@ -1729,7 +1729,7 @@
           <a:p>
             <a:fld id="{E2B49FB2-5219-46EB-905E-F29C7E013D5A}" type="datetimeFigureOut">
               <a:rPr lang="en-US" smtClean="0"/>
-              <a:t>9/24/2017</a:t>
+              <a:t>9/25/2017</a:t>
             </a:fld>
             <a:endParaRPr lang="en-US"/>
           </a:p>
@@ -1824,7 +1824,7 @@
           <a:p>
             <a:fld id="{E2B49FB2-5219-46EB-905E-F29C7E013D5A}" type="datetimeFigureOut">
               <a:rPr lang="en-US" smtClean="0"/>
-              <a:t>9/24/2017</a:t>
+              <a:t>9/25/2017</a:t>
             </a:fld>
             <a:endParaRPr lang="en-US"/>
           </a:p>
@@ -2101,7 +2101,7 @@
           <a:p>
             <a:fld id="{E2B49FB2-5219-46EB-905E-F29C7E013D5A}" type="datetimeFigureOut">
               <a:rPr lang="en-US" smtClean="0"/>
-              <a:t>9/24/2017</a:t>
+              <a:t>9/25/2017</a:t>
             </a:fld>
             <a:endParaRPr lang="en-US"/>
           </a:p>
@@ -2354,7 +2354,7 @@
           <a:p>
             <a:fld id="{E2B49FB2-5219-46EB-905E-F29C7E013D5A}" type="datetimeFigureOut">
               <a:rPr lang="en-US" smtClean="0"/>
-              <a:t>9/24/2017</a:t>
+              <a:t>9/25/2017</a:t>
             </a:fld>
             <a:endParaRPr lang="en-US"/>
           </a:p>
@@ -2567,7 +2567,7 @@
           <a:p>
             <a:fld id="{E2B49FB2-5219-46EB-905E-F29C7E013D5A}" type="datetimeFigureOut">
               <a:rPr lang="en-US" smtClean="0"/>
-              <a:t>9/24/2017</a:t>
+              <a:t>9/25/2017</a:t>
             </a:fld>
             <a:endParaRPr lang="en-US"/>
           </a:p>
@@ -3109,7 +3109,6 @@
               <a:rPr lang="en-US" dirty="0" smtClean="0"/>
               <a:t>HIV infected men</a:t>
             </a:r>
-            <a:endParaRPr lang="en-US" dirty="0" smtClean="0"/>
           </a:p>
           <a:p>
             <a:pPr lvl="1"/>
@@ -3222,13 +3221,13 @@
           <p:nvPr>
             <p:extLst>
               <p:ext uri="{D42A27DB-BD31-4B8C-83A1-F6EECF244321}">
-                <p14:modId xmlns:p14="http://schemas.microsoft.com/office/powerpoint/2010/main" val="1413523847"/>
+                <p14:modId xmlns:p14="http://schemas.microsoft.com/office/powerpoint/2010/main" val="2840459657"/>
               </p:ext>
             </p:extLst>
           </p:nvPr>
         </p:nvGraphicFramePr>
         <p:xfrm>
-          <a:off x="191388" y="1063257"/>
+          <a:off x="2404344" y="976686"/>
           <a:ext cx="7251187" cy="1865180"/>
         </p:xfrm>
         <a:graphic>
@@ -3280,7 +3279,7 @@
                         </a:spcAft>
                       </a:pPr>
                       <a:r>
-                        <a:rPr lang="en-US" sz="1200" b="1">
+                        <a:rPr lang="en-US" sz="1200" b="1" dirty="0">
                           <a:solidFill>
                             <a:srgbClr val="000000"/>
                           </a:solidFill>
@@ -3291,7 +3290,7 @@
                         </a:rPr>
                         <a:t>Table 2: Outcome Variables</a:t>
                       </a:r>
-                      <a:endParaRPr lang="en-US" sz="1100">
+                      <a:endParaRPr lang="en-US" sz="1100" dirty="0">
                         <a:effectLst/>
                         <a:latin typeface="Times New Roman" panose="02020603050405020304" pitchFamily="18" charset="0"/>
                         <a:ea typeface="Calibri" panose="020F0502020204030204" pitchFamily="34" charset="0"/>
@@ -3762,7 +3761,7 @@
                         </a:spcAft>
                       </a:pPr>
                       <a:r>
-                        <a:rPr lang="en-US" sz="1000">
+                        <a:rPr lang="en-US" sz="1000" dirty="0">
                           <a:solidFill>
                             <a:srgbClr val="000000"/>
                           </a:solidFill>
@@ -3773,7 +3772,7 @@
                         </a:rPr>
                         <a:t>42.31 ± 11.22</a:t>
                       </a:r>
-                      <a:endParaRPr lang="en-US" sz="1100">
+                      <a:endParaRPr lang="en-US" sz="1100" dirty="0">
                         <a:effectLst/>
                         <a:latin typeface="Times New Roman" panose="02020603050405020304" pitchFamily="18" charset="0"/>
                         <a:ea typeface="Calibri" panose="020F0502020204030204" pitchFamily="34" charset="0"/>
@@ -4515,7 +4514,7 @@
                         </a:spcAft>
                       </a:pPr>
                       <a:r>
-                        <a:rPr lang="en-US" sz="1000">
+                        <a:rPr lang="en-US" sz="1000" dirty="0">
                           <a:solidFill>
                             <a:srgbClr val="000000"/>
                           </a:solidFill>
@@ -4526,7 +4525,7 @@
                         </a:rPr>
                         <a:t>49.88 ± 10</a:t>
                       </a:r>
-                      <a:endParaRPr lang="en-US" sz="1100">
+                      <a:endParaRPr lang="en-US" sz="1100" dirty="0">
                         <a:effectLst/>
                         <a:latin typeface="Times New Roman" panose="02020603050405020304" pitchFamily="18" charset="0"/>
                         <a:ea typeface="Calibri" panose="020F0502020204030204" pitchFamily="34" charset="0"/>
@@ -4889,7 +4888,7 @@
                         </a:spcAft>
                       </a:pPr>
                       <a:r>
-                        <a:rPr lang="en-US" sz="1000">
+                        <a:rPr lang="en-US" sz="1000" dirty="0">
                           <a:solidFill>
                             <a:srgbClr val="FF0000"/>
                           </a:solidFill>
@@ -4900,7 +4899,7 @@
                         </a:rPr>
                         <a:t>32946.83 ± 114453.02</a:t>
                       </a:r>
-                      <a:endParaRPr lang="en-US" sz="1100">
+                      <a:endParaRPr lang="en-US" sz="1100" dirty="0">
                         <a:effectLst/>
                         <a:latin typeface="Times New Roman" panose="02020603050405020304" pitchFamily="18" charset="0"/>
                         <a:ea typeface="Calibri" panose="020F0502020204030204" pitchFamily="34" charset="0"/>
@@ -4937,7 +4936,7 @@
                         </a:spcAft>
                       </a:pPr>
                       <a:r>
-                        <a:rPr lang="en-US" sz="1000">
+                        <a:rPr lang="en-US" sz="1000" dirty="0">
                           <a:solidFill>
                             <a:srgbClr val="FF0000"/>
                           </a:solidFill>
@@ -4948,7 +4947,7 @@
                         </a:rPr>
                         <a:t>6216.35 ± 40801.57</a:t>
                       </a:r>
-                      <a:endParaRPr lang="en-US" sz="1100">
+                      <a:endParaRPr lang="en-US" sz="1100" dirty="0">
                         <a:effectLst/>
                         <a:latin typeface="Times New Roman" panose="02020603050405020304" pitchFamily="18" charset="0"/>
                         <a:ea typeface="Calibri" panose="020F0502020204030204" pitchFamily="34" charset="0"/>
@@ -5436,13 +5435,13 @@
           <p:nvPr>
             <p:extLst>
               <p:ext uri="{D42A27DB-BD31-4B8C-83A1-F6EECF244321}">
-                <p14:modId xmlns:p14="http://schemas.microsoft.com/office/powerpoint/2010/main" val="2311598718"/>
+                <p14:modId xmlns:p14="http://schemas.microsoft.com/office/powerpoint/2010/main" val="439027062"/>
               </p:ext>
             </p:extLst>
           </p:nvPr>
         </p:nvGraphicFramePr>
         <p:xfrm>
-          <a:off x="6582040" y="3024376"/>
+          <a:off x="6343971" y="3024376"/>
           <a:ext cx="5386677" cy="3726180"/>
         </p:xfrm>
         <a:graphic>
@@ -5494,7 +5493,7 @@
                         </a:spcAft>
                       </a:pPr>
                       <a:r>
-                        <a:rPr lang="en-US" sz="1200" b="1">
+                        <a:rPr lang="en-US" sz="1200" b="1" dirty="0">
                           <a:solidFill>
                             <a:srgbClr val="000000"/>
                           </a:solidFill>
@@ -5505,7 +5504,7 @@
                         </a:rPr>
                         <a:t>Table One: Demographics</a:t>
                       </a:r>
-                      <a:endParaRPr lang="en-US" sz="1100">
+                      <a:endParaRPr lang="en-US" sz="1100" dirty="0">
                         <a:effectLst/>
                         <a:latin typeface="Times New Roman" panose="02020603050405020304" pitchFamily="18" charset="0"/>
                         <a:ea typeface="Calibri" panose="020F0502020204030204" pitchFamily="34" charset="0"/>
@@ -7851,7 +7850,7 @@
                         </a:spcAft>
                       </a:pPr>
                       <a:r>
-                        <a:rPr lang="en-US" sz="1050">
+                        <a:rPr lang="en-US" sz="1050" dirty="0">
                           <a:solidFill>
                             <a:srgbClr val="000000"/>
                           </a:solidFill>
@@ -7862,7 +7861,7 @@
                         </a:rPr>
                         <a:t>43.11 ( 194 )</a:t>
                       </a:r>
-                      <a:endParaRPr lang="en-US" sz="1050">
+                      <a:endParaRPr lang="en-US" sz="1050" dirty="0">
                         <a:effectLst/>
                         <a:latin typeface="Times New Roman" panose="02020603050405020304" pitchFamily="18" charset="0"/>
                         <a:ea typeface="Calibri" panose="020F0502020204030204" pitchFamily="34" charset="0"/>
@@ -7954,7 +7953,7 @@
                         </a:spcAft>
                       </a:pPr>
                       <a:r>
-                        <a:rPr lang="en-US" sz="1050">
+                        <a:rPr lang="en-US" sz="1050" dirty="0">
                           <a:solidFill>
                             <a:srgbClr val="000000"/>
                           </a:solidFill>
@@ -7965,7 +7964,7 @@
                         </a:rPr>
                         <a:t>35.58 ( 174 )</a:t>
                       </a:r>
-                      <a:endParaRPr lang="en-US" sz="1050">
+                      <a:endParaRPr lang="en-US" sz="1050" dirty="0">
                         <a:effectLst/>
                         <a:latin typeface="Times New Roman" panose="02020603050405020304" pitchFamily="18" charset="0"/>
                         <a:ea typeface="Calibri" panose="020F0502020204030204" pitchFamily="34" charset="0"/>
@@ -8213,7 +8212,7 @@
                         </a:spcAft>
                       </a:pPr>
                       <a:r>
-                        <a:rPr lang="en-US" sz="1050">
+                        <a:rPr lang="en-US" sz="1050" dirty="0">
                           <a:solidFill>
                             <a:srgbClr val="FF0000"/>
                           </a:solidFill>
@@ -8224,7 +8223,7 @@
                         </a:rPr>
                         <a:t>76.92 ( 30 )</a:t>
                       </a:r>
-                      <a:endParaRPr lang="en-US" sz="1050">
+                      <a:endParaRPr lang="en-US" sz="1050" dirty="0">
                         <a:solidFill>
                           <a:srgbClr val="FF0000"/>
                         </a:solidFill>
@@ -10263,7 +10262,9 @@
         </p:nvSpPr>
         <p:spPr/>
         <p:txBody>
-          <a:bodyPr/>
+          <a:bodyPr>
+            <a:normAutofit lnSpcReduction="10000"/>
+          </a:bodyPr>
           <a:lstStyle/>
           <a:p>
             <a:r>
@@ -10282,8 +10283,20 @@
             <a:pPr lvl="1"/>
             <a:r>
               <a:rPr lang="en-US" dirty="0" smtClean="0"/>
-              <a:t>Models for all four outcomes</a:t>
+              <a:t>Models for all four </a:t>
             </a:r>
+            <a:r>
+              <a:rPr lang="en-US" dirty="0" smtClean="0"/>
+              <a:t>outcomes (CD4 + is primary)</a:t>
+            </a:r>
+          </a:p>
+          <a:p>
+            <a:pPr lvl="2"/>
+            <a:r>
+              <a:rPr lang="en-US" dirty="0" smtClean="0"/>
+              <a:t>Well distributed, lab value</a:t>
+            </a:r>
+            <a:endParaRPr lang="en-US" dirty="0" smtClean="0"/>
           </a:p>
           <a:p>
             <a:pPr lvl="1"/>
@@ -10291,7 +10304,6 @@
               <a:rPr lang="en-US" dirty="0" smtClean="0"/>
               <a:t>Hard drug use is primary covariate</a:t>
             </a:r>
-            <a:endParaRPr lang="en-US" dirty="0" smtClean="0"/>
           </a:p>
           <a:p>
             <a:r>
@@ -10354,8 +10366,11 @@
               <a:rPr lang="en-US" dirty="0" smtClean="0">
                 <a:sym typeface="Wingdings" panose="05000000000000000000" pitchFamily="2" charset="2"/>
               </a:rPr>
-              <a:t>Missing Data Issues/Sample Size</a:t>
+              <a:t>Sample Size/Viral Load Issues</a:t>
             </a:r>
+            <a:endParaRPr lang="en-US" dirty="0" smtClean="0">
+              <a:sym typeface="Wingdings" panose="05000000000000000000" pitchFamily="2" charset="2"/>
+            </a:endParaRPr>
           </a:p>
           <a:p>
             <a:pPr lvl="2"/>

</xml_diff>